<commit_message>
added images folders and modified filter_test to binary
Filter test converts to a binary image so it works on my computer
</commit_message>
<xml_diff>
--- a/Mean Vector Clustering w.pptx
+++ b/Mean Vector Clustering w.pptx
@@ -4613,43 +4613,11 @@
             </a:pPr>
             <a:r>
               <a:rPr lang="en-US" dirty="0" smtClean="0"/>
-              <a:t>If we </a:t>
-            </a:r>
-            <a:r>
-              <a:rPr lang="en-US" dirty="0" smtClean="0"/>
-              <a:t>guess a symbol that is known to be approximately </a:t>
-            </a:r>
-            <a:r>
-              <a:rPr lang="en-US" dirty="0" smtClean="0"/>
-              <a:t>normal then we </a:t>
-            </a:r>
-            <a:r>
-              <a:rPr lang="en-US" dirty="0" smtClean="0"/>
-              <a:t>can </a:t>
-            </a:r>
-            <a:r>
-              <a:rPr lang="en-US" dirty="0" smtClean="0"/>
-              <a:t>check </a:t>
-            </a:r>
-            <a:r>
-              <a:rPr lang="en-US" dirty="0" smtClean="0"/>
-              <a:t>if the </a:t>
-            </a:r>
-            <a:r>
-              <a:rPr lang="en-US" dirty="0" smtClean="0"/>
-              <a:t>delta</a:t>
-            </a:r>
-            <a:r>
-              <a:rPr lang="en-US" dirty="0" smtClean="0"/>
-              <a:t> is within </a:t>
+              <a:t>If we guess a symbol that is known to be approximately normal then we can check if the delta is within </a:t>
             </a:r>
             <a:r>
               <a:rPr lang="en-US" b="1" dirty="0" smtClean="0"/>
-              <a:t>two standard </a:t>
-            </a:r>
-            <a:r>
-              <a:rPr lang="en-US" b="1" dirty="0" smtClean="0"/>
-              <a:t>deviations </a:t>
+              <a:t>two standard deviations </a:t>
             </a:r>
             <a:r>
               <a:rPr lang="en-US" dirty="0" smtClean="0"/>
@@ -4661,39 +4629,7 @@
             </a:r>
             <a:r>
               <a:rPr lang="en-US" dirty="0" smtClean="0"/>
-              <a:t>This </a:t>
-            </a:r>
-            <a:r>
-              <a:rPr lang="en-US" dirty="0" smtClean="0"/>
-              <a:t>gives us </a:t>
-            </a:r>
-            <a:r>
-              <a:rPr lang="en-US" dirty="0" smtClean="0"/>
-              <a:t>95</a:t>
-            </a:r>
-            <a:r>
-              <a:rPr lang="en-US" dirty="0" smtClean="0"/>
-              <a:t>%  </a:t>
-            </a:r>
-            <a:r>
-              <a:rPr lang="en-US" dirty="0" smtClean="0"/>
-              <a:t>confidence </a:t>
-            </a:r>
-            <a:r>
-              <a:rPr lang="en-US" dirty="0" smtClean="0"/>
-              <a:t>that we should reject the glyph </a:t>
-            </a:r>
-            <a:r>
-              <a:rPr lang="en-US" dirty="0" smtClean="0"/>
-              <a:t>if it’s </a:t>
-            </a:r>
-            <a:r>
-              <a:rPr lang="en-US" dirty="0" smtClean="0"/>
-              <a:t>outside the threshold. </a:t>
-            </a:r>
-            <a:r>
-              <a:rPr lang="en-US" dirty="0" smtClean="0"/>
-              <a:t>(This is adjustable; since we’re “approximately” normal we can tweak to fit our confidence </a:t>
+              <a:t>This gives us 95%  confidence that we should reject the glyph if it’s outside the threshold. (This is adjustable; since we’re “approximately” normal we can tweak to fit our confidence </a:t>
             </a:r>
             <a:r>
               <a:rPr lang="en-US" dirty="0"/>
@@ -4752,51 +4688,7 @@
             </a:pPr>
             <a:r>
               <a:rPr lang="en-US" dirty="0" smtClean="0"/>
-              <a:t>If we </a:t>
-            </a:r>
-            <a:r>
-              <a:rPr lang="en-US" dirty="0" smtClean="0"/>
-              <a:t>guess a symbol </a:t>
-            </a:r>
-            <a:r>
-              <a:rPr lang="en-US" dirty="0" smtClean="0"/>
-              <a:t>is </a:t>
-            </a:r>
-            <a:r>
-              <a:rPr lang="en-US" dirty="0" smtClean="0"/>
-              <a:t>known </a:t>
-            </a:r>
-            <a:r>
-              <a:rPr lang="en-US" dirty="0" smtClean="0"/>
-              <a:t>to not </a:t>
-            </a:r>
-            <a:r>
-              <a:rPr lang="en-US" dirty="0" smtClean="0"/>
-              <a:t>be approximately </a:t>
-            </a:r>
-            <a:r>
-              <a:rPr lang="en-US" dirty="0" smtClean="0"/>
-              <a:t>normal things </a:t>
-            </a:r>
-            <a:r>
-              <a:rPr lang="en-US" dirty="0" smtClean="0"/>
-              <a:t>are </a:t>
-            </a:r>
-            <a:r>
-              <a:rPr lang="en-US" dirty="0" smtClean="0"/>
-              <a:t>trickier. We </a:t>
-            </a:r>
-            <a:r>
-              <a:rPr lang="en-US" dirty="0" smtClean="0"/>
-              <a:t>could interpolate or take a median value and suffers a 50% </a:t>
-            </a:r>
-            <a:r>
-              <a:rPr lang="en-US" dirty="0" smtClean="0"/>
-              <a:t>confidence </a:t>
-            </a:r>
-            <a:r>
-              <a:rPr lang="en-US" dirty="0" smtClean="0"/>
-              <a:t>rate (on the known data). The results are not nearly as nice. Most rejections of good data are because of this.</a:t>
+              <a:t>If we guess a symbol is known to not be approximately normal things are trickier. We could interpolate or take a median value and suffers a 50% confidence rate (on the known data). The results are not nearly as nice. Most rejections of good data are because of this.</a:t>
             </a:r>
           </a:p>
           <a:p>
@@ -4991,13 +4883,8 @@
             </a:pPr>
             <a:r>
               <a:rPr lang="en-US" dirty="0" smtClean="0"/>
-              <a:t>Poor performance on some symbols (such as 1’s, </a:t>
-            </a:r>
-            <a:r>
-              <a:rPr lang="en-US" dirty="0" smtClean="0"/>
-              <a:t>which look similar to 2’s)</a:t>
-            </a:r>
-            <a:endParaRPr lang="en-US" dirty="0" smtClean="0"/>
+              <a:t>Poor performance on some symbols (such as 1’s, which look similar to 2’s)</a:t>
+            </a:r>
           </a:p>
           <a:p>
             <a:pPr marL="285750" indent="-285750">
@@ -6135,7 +6022,19 @@
             </a:pPr>
             <a:r>
               <a:rPr lang="en-US" dirty="0" smtClean="0"/>
-              <a:t>Ratio of Histograms works very similar to zoning</a:t>
+              <a:t>Ratio of Histograms </a:t>
+            </a:r>
+            <a:r>
+              <a:rPr lang="en-US" smtClean="0"/>
+              <a:t>works </a:t>
+            </a:r>
+            <a:r>
+              <a:rPr lang="en-US" smtClean="0"/>
+              <a:t>similarly </a:t>
+            </a:r>
+            <a:r>
+              <a:rPr lang="en-US" dirty="0" smtClean="0"/>
+              <a:t>to zoning</a:t>
             </a:r>
             <a:endParaRPr lang="en-US" dirty="0"/>
           </a:p>

</xml_diff>